<commit_message>
versão do PPT enviada para o professor Cláudio para sugestões
</commit_message>
<xml_diff>
--- a/mono/Defesa TCC - DashGen - FINAL.pptx
+++ b/mono/Defesa TCC - DashGen - FINAL.pptx
@@ -340,7 +340,8 @@
           <a:p>
             <a:fld id="{2E700DB3-DBF0-4086-B675-117E7A9610B8}" type="datetimeFigureOut">
               <a:rPr lang="pt-BR" smtClean="0"/>
-              <a:t>08/03/2020</a:t>
+              <a:pPr/>
+              <a:t>09/03/2020</a:t>
             </a:fld>
             <a:endParaRPr lang="pt-BR"/>
           </a:p>
@@ -382,6 +383,7 @@
           <a:p>
             <a:fld id="{2119D8CF-8DEC-4D9F-84EE-ADF04DFF3391}" type="slidenum">
               <a:rPr lang="pt-BR" smtClean="0"/>
+              <a:pPr/>
               <a:t>‹nº›</a:t>
             </a:fld>
             <a:endParaRPr lang="pt-BR"/>
@@ -540,7 +542,8 @@
           <a:p>
             <a:fld id="{2E700DB3-DBF0-4086-B675-117E7A9610B8}" type="datetimeFigureOut">
               <a:rPr lang="pt-BR" smtClean="0"/>
-              <a:t>08/03/2020</a:t>
+              <a:pPr/>
+              <a:t>09/03/2020</a:t>
             </a:fld>
             <a:endParaRPr lang="pt-BR"/>
           </a:p>
@@ -582,6 +585,7 @@
           <a:p>
             <a:fld id="{2119D8CF-8DEC-4D9F-84EE-ADF04DFF3391}" type="slidenum">
               <a:rPr lang="pt-BR" smtClean="0"/>
+              <a:pPr/>
               <a:t>‹nº›</a:t>
             </a:fld>
             <a:endParaRPr lang="pt-BR"/>
@@ -715,7 +719,8 @@
           <a:p>
             <a:fld id="{2E700DB3-DBF0-4086-B675-117E7A9610B8}" type="datetimeFigureOut">
               <a:rPr lang="pt-BR" smtClean="0"/>
-              <a:t>08/03/2020</a:t>
+              <a:pPr/>
+              <a:t>09/03/2020</a:t>
             </a:fld>
             <a:endParaRPr lang="pt-BR"/>
           </a:p>
@@ -757,6 +762,7 @@
           <a:p>
             <a:fld id="{2119D8CF-8DEC-4D9F-84EE-ADF04DFF3391}" type="slidenum">
               <a:rPr lang="pt-BR" smtClean="0"/>
+              <a:pPr/>
               <a:t>‹nº›</a:t>
             </a:fld>
             <a:endParaRPr lang="pt-BR"/>
@@ -880,7 +886,8 @@
           <a:p>
             <a:fld id="{2E700DB3-DBF0-4086-B675-117E7A9610B8}" type="datetimeFigureOut">
               <a:rPr lang="pt-BR" smtClean="0"/>
-              <a:t>08/03/2020</a:t>
+              <a:pPr/>
+              <a:t>09/03/2020</a:t>
             </a:fld>
             <a:endParaRPr lang="pt-BR"/>
           </a:p>
@@ -922,6 +929,7 @@
           <a:p>
             <a:fld id="{2119D8CF-8DEC-4D9F-84EE-ADF04DFF3391}" type="slidenum">
               <a:rPr lang="pt-BR" smtClean="0"/>
+              <a:pPr/>
               <a:t>‹nº›</a:t>
             </a:fld>
             <a:endParaRPr lang="pt-BR"/>
@@ -1128,7 +1136,8 @@
           <a:p>
             <a:fld id="{2E700DB3-DBF0-4086-B675-117E7A9610B8}" type="datetimeFigureOut">
               <a:rPr lang="pt-BR" smtClean="0"/>
-              <a:t>08/03/2020</a:t>
+              <a:pPr/>
+              <a:t>09/03/2020</a:t>
             </a:fld>
             <a:endParaRPr lang="pt-BR"/>
           </a:p>
@@ -1170,6 +1179,7 @@
           <a:p>
             <a:fld id="{2119D8CF-8DEC-4D9F-84EE-ADF04DFF3391}" type="slidenum">
               <a:rPr lang="pt-BR" smtClean="0"/>
+              <a:pPr/>
               <a:t>‹nº›</a:t>
             </a:fld>
             <a:endParaRPr lang="pt-BR"/>
@@ -1446,7 +1456,8 @@
           <a:p>
             <a:fld id="{2E700DB3-DBF0-4086-B675-117E7A9610B8}" type="datetimeFigureOut">
               <a:rPr lang="pt-BR" smtClean="0"/>
-              <a:t>08/03/2020</a:t>
+              <a:pPr/>
+              <a:t>09/03/2020</a:t>
             </a:fld>
             <a:endParaRPr lang="pt-BR"/>
           </a:p>
@@ -1488,6 +1499,7 @@
           <a:p>
             <a:fld id="{2119D8CF-8DEC-4D9F-84EE-ADF04DFF3391}" type="slidenum">
               <a:rPr lang="pt-BR" smtClean="0"/>
+              <a:pPr/>
               <a:t>‹nº›</a:t>
             </a:fld>
             <a:endParaRPr lang="pt-BR"/>
@@ -1912,7 +1924,8 @@
           <a:p>
             <a:fld id="{2E700DB3-DBF0-4086-B675-117E7A9610B8}" type="datetimeFigureOut">
               <a:rPr lang="pt-BR" smtClean="0"/>
-              <a:t>08/03/2020</a:t>
+              <a:pPr/>
+              <a:t>09/03/2020</a:t>
             </a:fld>
             <a:endParaRPr lang="pt-BR"/>
           </a:p>
@@ -1954,6 +1967,7 @@
           <a:p>
             <a:fld id="{2119D8CF-8DEC-4D9F-84EE-ADF04DFF3391}" type="slidenum">
               <a:rPr lang="pt-BR" smtClean="0"/>
+              <a:pPr/>
               <a:t>‹nº›</a:t>
             </a:fld>
             <a:endParaRPr lang="pt-BR"/>
@@ -2060,7 +2074,8 @@
           <a:p>
             <a:fld id="{2E700DB3-DBF0-4086-B675-117E7A9610B8}" type="datetimeFigureOut">
               <a:rPr lang="pt-BR" smtClean="0"/>
-              <a:t>08/03/2020</a:t>
+              <a:pPr/>
+              <a:t>09/03/2020</a:t>
             </a:fld>
             <a:endParaRPr lang="pt-BR"/>
           </a:p>
@@ -2102,6 +2117,7 @@
           <a:p>
             <a:fld id="{2119D8CF-8DEC-4D9F-84EE-ADF04DFF3391}" type="slidenum">
               <a:rPr lang="pt-BR" smtClean="0"/>
+              <a:pPr/>
               <a:t>‹nº›</a:t>
             </a:fld>
             <a:endParaRPr lang="pt-BR"/>
@@ -2150,7 +2166,8 @@
           <a:p>
             <a:fld id="{2E700DB3-DBF0-4086-B675-117E7A9610B8}" type="datetimeFigureOut">
               <a:rPr lang="pt-BR" smtClean="0"/>
-              <a:t>08/03/2020</a:t>
+              <a:pPr/>
+              <a:t>09/03/2020</a:t>
             </a:fld>
             <a:endParaRPr lang="pt-BR"/>
           </a:p>
@@ -2192,6 +2209,7 @@
           <a:p>
             <a:fld id="{2119D8CF-8DEC-4D9F-84EE-ADF04DFF3391}" type="slidenum">
               <a:rPr lang="pt-BR" smtClean="0"/>
+              <a:pPr/>
               <a:t>‹nº›</a:t>
             </a:fld>
             <a:endParaRPr lang="pt-BR"/>
@@ -2424,7 +2442,8 @@
           <a:p>
             <a:fld id="{2E700DB3-DBF0-4086-B675-117E7A9610B8}" type="datetimeFigureOut">
               <a:rPr lang="pt-BR" smtClean="0"/>
-              <a:t>08/03/2020</a:t>
+              <a:pPr/>
+              <a:t>09/03/2020</a:t>
             </a:fld>
             <a:endParaRPr lang="pt-BR"/>
           </a:p>
@@ -2466,6 +2485,7 @@
           <a:p>
             <a:fld id="{2119D8CF-8DEC-4D9F-84EE-ADF04DFF3391}" type="slidenum">
               <a:rPr lang="pt-BR" smtClean="0"/>
+              <a:pPr/>
               <a:t>‹nº›</a:t>
             </a:fld>
             <a:endParaRPr lang="pt-BR"/>
@@ -2729,7 +2749,8 @@
           <a:p>
             <a:fld id="{2E700DB3-DBF0-4086-B675-117E7A9610B8}" type="datetimeFigureOut">
               <a:rPr lang="pt-BR" smtClean="0"/>
-              <a:t>08/03/2020</a:t>
+              <a:pPr/>
+              <a:t>09/03/2020</a:t>
             </a:fld>
             <a:endParaRPr lang="pt-BR"/>
           </a:p>
@@ -2771,6 +2792,7 @@
           <a:p>
             <a:fld id="{2119D8CF-8DEC-4D9F-84EE-ADF04DFF3391}" type="slidenum">
               <a:rPr lang="pt-BR" smtClean="0"/>
+              <a:pPr/>
               <a:t>‹nº›</a:t>
             </a:fld>
             <a:endParaRPr lang="pt-BR"/>
@@ -3027,7 +3049,8 @@
           <a:p>
             <a:fld id="{2E700DB3-DBF0-4086-B675-117E7A9610B8}" type="datetimeFigureOut">
               <a:rPr lang="pt-BR" smtClean="0"/>
-              <a:t>08/03/2020</a:t>
+              <a:pPr/>
+              <a:t>09/03/2020</a:t>
             </a:fld>
             <a:endParaRPr lang="pt-BR"/>
           </a:p>
@@ -3101,6 +3124,7 @@
           <a:p>
             <a:fld id="{2119D8CF-8DEC-4D9F-84EE-ADF04DFF3391}" type="slidenum">
               <a:rPr lang="pt-BR" smtClean="0"/>
+              <a:pPr/>
               <a:t>‹nº›</a:t>
             </a:fld>
             <a:endParaRPr lang="pt-BR"/>
@@ -3746,7 +3770,7 @@
           <a:blip r:embed="rId2" cstate="print">
             <a:extLst>
               <a:ext uri="{28A0092B-C50C-407E-A947-70E740481C1C}">
-                <a14:useLocalDpi xmlns:a14="http://schemas.microsoft.com/office/drawing/2010/main" val="0"/>
+                <a14:useLocalDpi xmlns:a14="http://schemas.microsoft.com/office/drawing/2010/main" xmlns="" val="0"/>
               </a:ext>
             </a:extLst>
           </a:blip>
@@ -3766,7 +3790,7 @@
           <a:noFill/>
           <a:extLst>
             <a:ext uri="{909E8E84-426E-40DD-AFC4-6F175D3DCCD1}">
-              <a14:hiddenFill xmlns:a14="http://schemas.microsoft.com/office/drawing/2010/main">
+              <a14:hiddenFill xmlns:a14="http://schemas.microsoft.com/office/drawing/2010/main" xmlns="">
                 <a:solidFill>
                   <a:srgbClr val="FFFFFF"/>
                 </a:solidFill>
@@ -3995,7 +4019,7 @@
     </p:spTree>
     <p:extLst>
       <p:ext uri="{BB962C8B-B14F-4D97-AF65-F5344CB8AC3E}">
-        <p14:creationId xmlns:p14="http://schemas.microsoft.com/office/powerpoint/2010/main" val="3203044337"/>
+        <p14:creationId xmlns:p14="http://schemas.microsoft.com/office/powerpoint/2010/main" xmlns="" val="3203044337"/>
       </p:ext>
     </p:extLst>
   </p:cSld>
@@ -4144,7 +4168,7 @@
     </p:spTree>
     <p:extLst>
       <p:ext uri="{BB962C8B-B14F-4D97-AF65-F5344CB8AC3E}">
-        <p14:creationId xmlns:p14="http://schemas.microsoft.com/office/powerpoint/2010/main" val="2848151579"/>
+        <p14:creationId xmlns:p14="http://schemas.microsoft.com/office/powerpoint/2010/main" xmlns="" val="2848151579"/>
       </p:ext>
     </p:extLst>
   </p:cSld>
@@ -5070,7 +5094,7 @@
     </p:spTree>
     <p:extLst>
       <p:ext uri="{BB962C8B-B14F-4D97-AF65-F5344CB8AC3E}">
-        <p14:creationId xmlns:p14="http://schemas.microsoft.com/office/powerpoint/2010/main" val="2899401314"/>
+        <p14:creationId xmlns:p14="http://schemas.microsoft.com/office/powerpoint/2010/main" xmlns="" val="2899401314"/>
       </p:ext>
     </p:extLst>
   </p:cSld>
@@ -6130,7 +6154,7 @@
     </p:spTree>
     <p:extLst>
       <p:ext uri="{BB962C8B-B14F-4D97-AF65-F5344CB8AC3E}">
-        <p14:creationId xmlns:p14="http://schemas.microsoft.com/office/powerpoint/2010/main" val="50472887"/>
+        <p14:creationId xmlns:p14="http://schemas.microsoft.com/office/powerpoint/2010/main" xmlns="" val="50472887"/>
       </p:ext>
     </p:extLst>
   </p:cSld>
@@ -6324,7 +6348,7 @@
           <a:blip r:embed="rId2" cstate="print">
             <a:extLst>
               <a:ext uri="{28A0092B-C50C-407E-A947-70E740481C1C}">
-                <a14:useLocalDpi xmlns:a14="http://schemas.microsoft.com/office/drawing/2010/main" val="0"/>
+                <a14:useLocalDpi xmlns:a14="http://schemas.microsoft.com/office/drawing/2010/main" xmlns="" val="0"/>
               </a:ext>
             </a:extLst>
           </a:blip>
@@ -6345,7 +6369,7 @@
     </p:spTree>
     <p:extLst>
       <p:ext uri="{BB962C8B-B14F-4D97-AF65-F5344CB8AC3E}">
-        <p14:creationId xmlns:p14="http://schemas.microsoft.com/office/powerpoint/2010/main" val="966469963"/>
+        <p14:creationId xmlns:p14="http://schemas.microsoft.com/office/powerpoint/2010/main" xmlns="" val="966469963"/>
       </p:ext>
     </p:extLst>
   </p:cSld>
@@ -6600,7 +6624,7 @@
     </p:spTree>
     <p:extLst>
       <p:ext uri="{BB962C8B-B14F-4D97-AF65-F5344CB8AC3E}">
-        <p14:creationId xmlns:p14="http://schemas.microsoft.com/office/powerpoint/2010/main" val="1162597756"/>
+        <p14:creationId xmlns:p14="http://schemas.microsoft.com/office/powerpoint/2010/main" xmlns="" val="1162597756"/>
       </p:ext>
     </p:extLst>
   </p:cSld>
@@ -7031,7 +7055,7 @@
     </p:spTree>
     <p:extLst>
       <p:ext uri="{BB962C8B-B14F-4D97-AF65-F5344CB8AC3E}">
-        <p14:creationId xmlns:p14="http://schemas.microsoft.com/office/powerpoint/2010/main" val="3771295850"/>
+        <p14:creationId xmlns:p14="http://schemas.microsoft.com/office/powerpoint/2010/main" xmlns="" val="3771295850"/>
       </p:ext>
     </p:extLst>
   </p:cSld>
@@ -8100,7 +8124,7 @@
     </p:spTree>
     <p:extLst>
       <p:ext uri="{BB962C8B-B14F-4D97-AF65-F5344CB8AC3E}">
-        <p14:creationId xmlns:p14="http://schemas.microsoft.com/office/powerpoint/2010/main" val="2360740904"/>
+        <p14:creationId xmlns:p14="http://schemas.microsoft.com/office/powerpoint/2010/main" xmlns="" val="2360740904"/>
       </p:ext>
     </p:extLst>
   </p:cSld>
@@ -9646,7 +9670,7 @@
     </p:spTree>
     <p:extLst>
       <p:ext uri="{BB962C8B-B14F-4D97-AF65-F5344CB8AC3E}">
-        <p14:creationId xmlns:p14="http://schemas.microsoft.com/office/powerpoint/2010/main" val="2053396683"/>
+        <p14:creationId xmlns:p14="http://schemas.microsoft.com/office/powerpoint/2010/main" xmlns="" val="2053396683"/>
       </p:ext>
     </p:extLst>
   </p:cSld>
@@ -10339,7 +10363,7 @@
     </p:spTree>
     <p:extLst>
       <p:ext uri="{BB962C8B-B14F-4D97-AF65-F5344CB8AC3E}">
-        <p14:creationId xmlns:p14="http://schemas.microsoft.com/office/powerpoint/2010/main" val="749781141"/>
+        <p14:creationId xmlns:p14="http://schemas.microsoft.com/office/powerpoint/2010/main" xmlns="" val="749781141"/>
       </p:ext>
     </p:extLst>
   </p:cSld>
@@ -10964,7 +10988,7 @@
     </p:spTree>
     <p:extLst>
       <p:ext uri="{BB962C8B-B14F-4D97-AF65-F5344CB8AC3E}">
-        <p14:creationId xmlns:p14="http://schemas.microsoft.com/office/powerpoint/2010/main" val="40006603"/>
+        <p14:creationId xmlns:p14="http://schemas.microsoft.com/office/powerpoint/2010/main" xmlns="" val="40006603"/>
       </p:ext>
     </p:extLst>
   </p:cSld>
@@ -11348,7 +11372,7 @@
     </p:spTree>
     <p:extLst>
       <p:ext uri="{BB962C8B-B14F-4D97-AF65-F5344CB8AC3E}">
-        <p14:creationId xmlns:p14="http://schemas.microsoft.com/office/powerpoint/2010/main" val="3742307202"/>
+        <p14:creationId xmlns:p14="http://schemas.microsoft.com/office/powerpoint/2010/main" xmlns="" val="3742307202"/>
       </p:ext>
     </p:extLst>
   </p:cSld>
@@ -11671,7 +11695,7 @@
     </p:spTree>
     <p:extLst>
       <p:ext uri="{BB962C8B-B14F-4D97-AF65-F5344CB8AC3E}">
-        <p14:creationId xmlns:p14="http://schemas.microsoft.com/office/powerpoint/2010/main" val="706922232"/>
+        <p14:creationId xmlns:p14="http://schemas.microsoft.com/office/powerpoint/2010/main" xmlns="" val="706922232"/>
       </p:ext>
     </p:extLst>
   </p:cSld>
@@ -12232,7 +12256,7 @@
     </p:spTree>
     <p:extLst>
       <p:ext uri="{BB962C8B-B14F-4D97-AF65-F5344CB8AC3E}">
-        <p14:creationId xmlns:p14="http://schemas.microsoft.com/office/powerpoint/2010/main" val="1649903801"/>
+        <p14:creationId xmlns:p14="http://schemas.microsoft.com/office/powerpoint/2010/main" xmlns="" val="1649903801"/>
       </p:ext>
     </p:extLst>
   </p:cSld>
@@ -12513,10 +12537,10 @@
           <p:nvPr/>
         </p:nvPicPr>
         <p:blipFill>
-          <a:blip r:embed="rId2">
+          <a:blip r:embed="rId2" cstate="print">
             <a:extLst>
               <a:ext uri="{28A0092B-C50C-407E-A947-70E740481C1C}">
-                <a14:useLocalDpi xmlns:a14="http://schemas.microsoft.com/office/drawing/2010/main" val="0"/>
+                <a14:useLocalDpi xmlns:a14="http://schemas.microsoft.com/office/drawing/2010/main" xmlns="" val="0"/>
               </a:ext>
             </a:extLst>
           </a:blip>
@@ -12539,14 +12563,14 @@
           </a:ln>
           <a:extLst>
             <a:ext uri="{909E8E84-426E-40DD-AFC4-6F175D3DCCD1}">
-              <a14:hiddenFill xmlns:a14="http://schemas.microsoft.com/office/drawing/2010/main">
+              <a14:hiddenFill xmlns:a14="http://schemas.microsoft.com/office/drawing/2010/main" xmlns="">
                 <a:solidFill>
                   <a:schemeClr val="accent1"/>
                 </a:solidFill>
               </a14:hiddenFill>
             </a:ext>
             <a:ext uri="{91240B29-F687-4F45-9708-019B960494DF}">
-              <a14:hiddenLine xmlns:a14="http://schemas.microsoft.com/office/drawing/2010/main" w="9525">
+              <a14:hiddenLine xmlns:a14="http://schemas.microsoft.com/office/drawing/2010/main" xmlns="" w="9525">
                 <a:solidFill>
                   <a:schemeClr val="tx1"/>
                 </a:solidFill>
@@ -12561,7 +12585,7 @@
     </p:spTree>
     <p:extLst>
       <p:ext uri="{BB962C8B-B14F-4D97-AF65-F5344CB8AC3E}">
-        <p14:creationId xmlns:p14="http://schemas.microsoft.com/office/powerpoint/2010/main" val="3966991713"/>
+        <p14:creationId xmlns:p14="http://schemas.microsoft.com/office/powerpoint/2010/main" xmlns="" val="3966991713"/>
       </p:ext>
     </p:extLst>
   </p:cSld>
@@ -12824,7 +12848,7 @@
     </p:spTree>
     <p:extLst>
       <p:ext uri="{BB962C8B-B14F-4D97-AF65-F5344CB8AC3E}">
-        <p14:creationId xmlns:p14="http://schemas.microsoft.com/office/powerpoint/2010/main" val="1163120309"/>
+        <p14:creationId xmlns:p14="http://schemas.microsoft.com/office/powerpoint/2010/main" xmlns="" val="1163120309"/>
       </p:ext>
     </p:extLst>
   </p:cSld>
@@ -13061,7 +13085,7 @@
           <a:blip r:embed="rId2" cstate="print">
             <a:extLst>
               <a:ext uri="{28A0092B-C50C-407E-A947-70E740481C1C}">
-                <a14:useLocalDpi xmlns:a14="http://schemas.microsoft.com/office/drawing/2010/main" val="0"/>
+                <a14:useLocalDpi xmlns:a14="http://schemas.microsoft.com/office/drawing/2010/main" xmlns="" val="0"/>
               </a:ext>
             </a:extLst>
           </a:blip>
@@ -13087,7 +13111,7 @@
     </p:spTree>
     <p:extLst>
       <p:ext uri="{BB962C8B-B14F-4D97-AF65-F5344CB8AC3E}">
-        <p14:creationId xmlns:p14="http://schemas.microsoft.com/office/powerpoint/2010/main" val="2830176727"/>
+        <p14:creationId xmlns:p14="http://schemas.microsoft.com/office/powerpoint/2010/main" xmlns="" val="2830176727"/>
       </p:ext>
     </p:extLst>
   </p:cSld>
@@ -13179,7 +13203,7 @@
           <a:blip r:embed="rId2" cstate="print">
             <a:extLst>
               <a:ext uri="{28A0092B-C50C-407E-A947-70E740481C1C}">
-                <a14:useLocalDpi xmlns:a14="http://schemas.microsoft.com/office/drawing/2010/main" val="0"/>
+                <a14:useLocalDpi xmlns:a14="http://schemas.microsoft.com/office/drawing/2010/main" xmlns="" val="0"/>
               </a:ext>
             </a:extLst>
           </a:blip>
@@ -13205,7 +13229,7 @@
     </p:spTree>
     <p:extLst>
       <p:ext uri="{BB962C8B-B14F-4D97-AF65-F5344CB8AC3E}">
-        <p14:creationId xmlns:p14="http://schemas.microsoft.com/office/powerpoint/2010/main" val="447413865"/>
+        <p14:creationId xmlns:p14="http://schemas.microsoft.com/office/powerpoint/2010/main" xmlns="" val="447413865"/>
       </p:ext>
     </p:extLst>
   </p:cSld>
@@ -13297,7 +13321,7 @@
           <a:blip r:embed="rId2" cstate="print">
             <a:extLst>
               <a:ext uri="{28A0092B-C50C-407E-A947-70E740481C1C}">
-                <a14:useLocalDpi xmlns:a14="http://schemas.microsoft.com/office/drawing/2010/main" val="0"/>
+                <a14:useLocalDpi xmlns:a14="http://schemas.microsoft.com/office/drawing/2010/main" xmlns="" val="0"/>
               </a:ext>
             </a:extLst>
           </a:blip>
@@ -13323,7 +13347,7 @@
     </p:spTree>
     <p:extLst>
       <p:ext uri="{BB962C8B-B14F-4D97-AF65-F5344CB8AC3E}">
-        <p14:creationId xmlns:p14="http://schemas.microsoft.com/office/powerpoint/2010/main" val="3798993823"/>
+        <p14:creationId xmlns:p14="http://schemas.microsoft.com/office/powerpoint/2010/main" xmlns="" val="3798993823"/>
       </p:ext>
     </p:extLst>
   </p:cSld>
@@ -13449,7 +13473,7 @@
     </p:spTree>
     <p:extLst>
       <p:ext uri="{BB962C8B-B14F-4D97-AF65-F5344CB8AC3E}">
-        <p14:creationId xmlns:p14="http://schemas.microsoft.com/office/powerpoint/2010/main" val="1719666060"/>
+        <p14:creationId xmlns:p14="http://schemas.microsoft.com/office/powerpoint/2010/main" xmlns="" val="1719666060"/>
       </p:ext>
     </p:extLst>
   </p:cSld>
@@ -13733,10 +13757,10 @@
           <p:nvPr/>
         </p:nvPicPr>
         <p:blipFill>
-          <a:blip r:embed="rId2">
+          <a:blip r:embed="rId2" cstate="print">
             <a:extLst>
               <a:ext uri="{28A0092B-C50C-407E-A947-70E740481C1C}">
-                <a14:useLocalDpi xmlns:a14="http://schemas.microsoft.com/office/drawing/2010/main" val="0"/>
+                <a14:useLocalDpi xmlns:a14="http://schemas.microsoft.com/office/drawing/2010/main" xmlns="" val="0"/>
               </a:ext>
             </a:extLst>
           </a:blip>
@@ -13759,14 +13783,14 @@
           </a:ln>
           <a:extLst>
             <a:ext uri="{909E8E84-426E-40DD-AFC4-6F175D3DCCD1}">
-              <a14:hiddenFill xmlns:a14="http://schemas.microsoft.com/office/drawing/2010/main">
+              <a14:hiddenFill xmlns:a14="http://schemas.microsoft.com/office/drawing/2010/main" xmlns="">
                 <a:solidFill>
                   <a:schemeClr val="accent1"/>
                 </a:solidFill>
               </a14:hiddenFill>
             </a:ext>
             <a:ext uri="{91240B29-F687-4F45-9708-019B960494DF}">
-              <a14:hiddenLine xmlns:a14="http://schemas.microsoft.com/office/drawing/2010/main" w="9525">
+              <a14:hiddenLine xmlns:a14="http://schemas.microsoft.com/office/drawing/2010/main" xmlns="" w="9525">
                 <a:solidFill>
                   <a:schemeClr val="tx1"/>
                 </a:solidFill>
@@ -13781,7 +13805,7 @@
     </p:spTree>
     <p:extLst>
       <p:ext uri="{BB962C8B-B14F-4D97-AF65-F5344CB8AC3E}">
-        <p14:creationId xmlns:p14="http://schemas.microsoft.com/office/powerpoint/2010/main" val="596928897"/>
+        <p14:creationId xmlns:p14="http://schemas.microsoft.com/office/powerpoint/2010/main" xmlns="" val="596928897"/>
       </p:ext>
     </p:extLst>
   </p:cSld>
@@ -13923,7 +13947,7 @@
     </p:spTree>
     <p:extLst>
       <p:ext uri="{BB962C8B-B14F-4D97-AF65-F5344CB8AC3E}">
-        <p14:creationId xmlns:p14="http://schemas.microsoft.com/office/powerpoint/2010/main" val="2239382176"/>
+        <p14:creationId xmlns:p14="http://schemas.microsoft.com/office/powerpoint/2010/main" xmlns="" val="2239382176"/>
       </p:ext>
     </p:extLst>
   </p:cSld>
@@ -14171,7 +14195,7 @@
     </p:spTree>
     <p:extLst>
       <p:ext uri="{BB962C8B-B14F-4D97-AF65-F5344CB8AC3E}">
-        <p14:creationId xmlns:p14="http://schemas.microsoft.com/office/powerpoint/2010/main" val="3796481092"/>
+        <p14:creationId xmlns:p14="http://schemas.microsoft.com/office/powerpoint/2010/main" xmlns="" val="3796481092"/>
       </p:ext>
     </p:extLst>
   </p:cSld>
@@ -14484,10 +14508,10 @@
           <p:nvPr/>
         </p:nvPicPr>
         <p:blipFill>
-          <a:blip r:embed="rId2">
+          <a:blip r:embed="rId2" cstate="print">
             <a:extLst>
               <a:ext uri="{28A0092B-C50C-407E-A947-70E740481C1C}">
-                <a14:useLocalDpi xmlns:a14="http://schemas.microsoft.com/office/drawing/2010/main" val="0"/>
+                <a14:useLocalDpi xmlns:a14="http://schemas.microsoft.com/office/drawing/2010/main" xmlns="" val="0"/>
               </a:ext>
             </a:extLst>
           </a:blip>
@@ -14510,14 +14534,14 @@
           </a:ln>
           <a:extLst>
             <a:ext uri="{909E8E84-426E-40DD-AFC4-6F175D3DCCD1}">
-              <a14:hiddenFill xmlns:a14="http://schemas.microsoft.com/office/drawing/2010/main">
+              <a14:hiddenFill xmlns:a14="http://schemas.microsoft.com/office/drawing/2010/main" xmlns="">
                 <a:solidFill>
                   <a:schemeClr val="accent1"/>
                 </a:solidFill>
               </a14:hiddenFill>
             </a:ext>
             <a:ext uri="{91240B29-F687-4F45-9708-019B960494DF}">
-              <a14:hiddenLine xmlns:a14="http://schemas.microsoft.com/office/drawing/2010/main" w="9525">
+              <a14:hiddenLine xmlns:a14="http://schemas.microsoft.com/office/drawing/2010/main" xmlns="" w="9525">
                 <a:solidFill>
                   <a:schemeClr val="tx1"/>
                 </a:solidFill>
@@ -14564,7 +14588,7 @@
     </p:spTree>
     <p:extLst>
       <p:ext uri="{BB962C8B-B14F-4D97-AF65-F5344CB8AC3E}">
-        <p14:creationId xmlns:p14="http://schemas.microsoft.com/office/powerpoint/2010/main" val="1782519753"/>
+        <p14:creationId xmlns:p14="http://schemas.microsoft.com/office/powerpoint/2010/main" xmlns="" val="1782519753"/>
       </p:ext>
     </p:extLst>
   </p:cSld>
@@ -14677,7 +14701,7 @@
     </p:spTree>
     <p:extLst>
       <p:ext uri="{BB962C8B-B14F-4D97-AF65-F5344CB8AC3E}">
-        <p14:creationId xmlns:p14="http://schemas.microsoft.com/office/powerpoint/2010/main" val="1219522875"/>
+        <p14:creationId xmlns:p14="http://schemas.microsoft.com/office/powerpoint/2010/main" xmlns="" val="1219522875"/>
       </p:ext>
     </p:extLst>
   </p:cSld>
@@ -14897,10 +14921,10 @@
           <p:nvPr/>
         </p:nvPicPr>
         <p:blipFill>
-          <a:blip r:embed="rId2">
+          <a:blip r:embed="rId2" cstate="print">
             <a:extLst>
               <a:ext uri="{28A0092B-C50C-407E-A947-70E740481C1C}">
-                <a14:useLocalDpi xmlns:a14="http://schemas.microsoft.com/office/drawing/2010/main" val="0"/>
+                <a14:useLocalDpi xmlns:a14="http://schemas.microsoft.com/office/drawing/2010/main" xmlns="" val="0"/>
               </a:ext>
             </a:extLst>
           </a:blip>
@@ -14923,14 +14947,14 @@
           </a:ln>
           <a:extLst>
             <a:ext uri="{909E8E84-426E-40DD-AFC4-6F175D3DCCD1}">
-              <a14:hiddenFill xmlns:a14="http://schemas.microsoft.com/office/drawing/2010/main">
+              <a14:hiddenFill xmlns:a14="http://schemas.microsoft.com/office/drawing/2010/main" xmlns="">
                 <a:solidFill>
                   <a:schemeClr val="accent1"/>
                 </a:solidFill>
               </a14:hiddenFill>
             </a:ext>
             <a:ext uri="{91240B29-F687-4F45-9708-019B960494DF}">
-              <a14:hiddenLine xmlns:a14="http://schemas.microsoft.com/office/drawing/2010/main" w="9525">
+              <a14:hiddenLine xmlns:a14="http://schemas.microsoft.com/office/drawing/2010/main" xmlns="" w="9525">
                 <a:solidFill>
                   <a:schemeClr val="tx1"/>
                 </a:solidFill>
@@ -14945,7 +14969,7 @@
     </p:spTree>
     <p:extLst>
       <p:ext uri="{BB962C8B-B14F-4D97-AF65-F5344CB8AC3E}">
-        <p14:creationId xmlns:p14="http://schemas.microsoft.com/office/powerpoint/2010/main" val="4005482876"/>
+        <p14:creationId xmlns:p14="http://schemas.microsoft.com/office/powerpoint/2010/main" xmlns="" val="4005482876"/>
       </p:ext>
     </p:extLst>
   </p:cSld>
@@ -15020,10 +15044,10 @@
           <p:nvPr/>
         </p:nvPicPr>
         <p:blipFill>
-          <a:blip r:embed="rId2">
+          <a:blip r:embed="rId2" cstate="print">
             <a:extLst>
               <a:ext uri="{28A0092B-C50C-407E-A947-70E740481C1C}">
-                <a14:useLocalDpi xmlns:a14="http://schemas.microsoft.com/office/drawing/2010/main" val="0"/>
+                <a14:useLocalDpi xmlns:a14="http://schemas.microsoft.com/office/drawing/2010/main" xmlns="" val="0"/>
               </a:ext>
             </a:extLst>
           </a:blip>
@@ -15046,14 +15070,14 @@
           </a:ln>
           <a:extLst>
             <a:ext uri="{909E8E84-426E-40DD-AFC4-6F175D3DCCD1}">
-              <a14:hiddenFill xmlns:a14="http://schemas.microsoft.com/office/drawing/2010/main">
+              <a14:hiddenFill xmlns:a14="http://schemas.microsoft.com/office/drawing/2010/main" xmlns="">
                 <a:solidFill>
                   <a:schemeClr val="accent1"/>
                 </a:solidFill>
               </a14:hiddenFill>
             </a:ext>
             <a:ext uri="{91240B29-F687-4F45-9708-019B960494DF}">
-              <a14:hiddenLine xmlns:a14="http://schemas.microsoft.com/office/drawing/2010/main" w="9525">
+              <a14:hiddenLine xmlns:a14="http://schemas.microsoft.com/office/drawing/2010/main" xmlns="" w="9525">
                 <a:solidFill>
                   <a:schemeClr val="tx1"/>
                 </a:solidFill>
@@ -15074,10 +15098,10 @@
           <p:nvPr/>
         </p:nvPicPr>
         <p:blipFill>
-          <a:blip r:embed="rId3">
+          <a:blip r:embed="rId3" cstate="print">
             <a:extLst>
               <a:ext uri="{28A0092B-C50C-407E-A947-70E740481C1C}">
-                <a14:useLocalDpi xmlns:a14="http://schemas.microsoft.com/office/drawing/2010/main" val="0"/>
+                <a14:useLocalDpi xmlns:a14="http://schemas.microsoft.com/office/drawing/2010/main" xmlns="" val="0"/>
               </a:ext>
             </a:extLst>
           </a:blip>
@@ -15100,14 +15124,14 @@
           </a:ln>
           <a:extLst>
             <a:ext uri="{909E8E84-426E-40DD-AFC4-6F175D3DCCD1}">
-              <a14:hiddenFill xmlns:a14="http://schemas.microsoft.com/office/drawing/2010/main">
+              <a14:hiddenFill xmlns:a14="http://schemas.microsoft.com/office/drawing/2010/main" xmlns="">
                 <a:solidFill>
                   <a:schemeClr val="accent1"/>
                 </a:solidFill>
               </a14:hiddenFill>
             </a:ext>
             <a:ext uri="{91240B29-F687-4F45-9708-019B960494DF}">
-              <a14:hiddenLine xmlns:a14="http://schemas.microsoft.com/office/drawing/2010/main" w="9525">
+              <a14:hiddenLine xmlns:a14="http://schemas.microsoft.com/office/drawing/2010/main" xmlns="" w="9525">
                 <a:solidFill>
                   <a:schemeClr val="tx1"/>
                 </a:solidFill>
@@ -15122,7 +15146,7 @@
     </p:spTree>
     <p:extLst>
       <p:ext uri="{BB962C8B-B14F-4D97-AF65-F5344CB8AC3E}">
-        <p14:creationId xmlns:p14="http://schemas.microsoft.com/office/powerpoint/2010/main" val="2703448726"/>
+        <p14:creationId xmlns:p14="http://schemas.microsoft.com/office/powerpoint/2010/main" xmlns="" val="2703448726"/>
       </p:ext>
     </p:extLst>
   </p:cSld>
@@ -15197,10 +15221,10 @@
           <p:nvPr/>
         </p:nvPicPr>
         <p:blipFill>
-          <a:blip r:embed="rId2">
+          <a:blip r:embed="rId2" cstate="print">
             <a:extLst>
               <a:ext uri="{28A0092B-C50C-407E-A947-70E740481C1C}">
-                <a14:useLocalDpi xmlns:a14="http://schemas.microsoft.com/office/drawing/2010/main" val="0"/>
+                <a14:useLocalDpi xmlns:a14="http://schemas.microsoft.com/office/drawing/2010/main" xmlns="" val="0"/>
               </a:ext>
             </a:extLst>
           </a:blip>
@@ -15223,14 +15247,14 @@
           </a:ln>
           <a:extLst>
             <a:ext uri="{909E8E84-426E-40DD-AFC4-6F175D3DCCD1}">
-              <a14:hiddenFill xmlns:a14="http://schemas.microsoft.com/office/drawing/2010/main">
+              <a14:hiddenFill xmlns:a14="http://schemas.microsoft.com/office/drawing/2010/main" xmlns="">
                 <a:solidFill>
                   <a:schemeClr val="accent1"/>
                 </a:solidFill>
               </a14:hiddenFill>
             </a:ext>
             <a:ext uri="{91240B29-F687-4F45-9708-019B960494DF}">
-              <a14:hiddenLine xmlns:a14="http://schemas.microsoft.com/office/drawing/2010/main" w="9525">
+              <a14:hiddenLine xmlns:a14="http://schemas.microsoft.com/office/drawing/2010/main" xmlns="" w="9525">
                 <a:solidFill>
                   <a:schemeClr val="tx1"/>
                 </a:solidFill>
@@ -15245,7 +15269,7 @@
     </p:spTree>
     <p:extLst>
       <p:ext uri="{BB962C8B-B14F-4D97-AF65-F5344CB8AC3E}">
-        <p14:creationId xmlns:p14="http://schemas.microsoft.com/office/powerpoint/2010/main" val="131747850"/>
+        <p14:creationId xmlns:p14="http://schemas.microsoft.com/office/powerpoint/2010/main" xmlns="" val="131747850"/>
       </p:ext>
     </p:extLst>
   </p:cSld>
@@ -15320,10 +15344,10 @@
           <p:nvPr/>
         </p:nvPicPr>
         <p:blipFill>
-          <a:blip r:embed="rId2">
+          <a:blip r:embed="rId2" cstate="print">
             <a:extLst>
               <a:ext uri="{28A0092B-C50C-407E-A947-70E740481C1C}">
-                <a14:useLocalDpi xmlns:a14="http://schemas.microsoft.com/office/drawing/2010/main" val="0"/>
+                <a14:useLocalDpi xmlns:a14="http://schemas.microsoft.com/office/drawing/2010/main" xmlns="" val="0"/>
               </a:ext>
             </a:extLst>
           </a:blip>
@@ -15346,14 +15370,14 @@
           </a:ln>
           <a:extLst>
             <a:ext uri="{909E8E84-426E-40DD-AFC4-6F175D3DCCD1}">
-              <a14:hiddenFill xmlns:a14="http://schemas.microsoft.com/office/drawing/2010/main">
+              <a14:hiddenFill xmlns:a14="http://schemas.microsoft.com/office/drawing/2010/main" xmlns="">
                 <a:solidFill>
                   <a:schemeClr val="accent1"/>
                 </a:solidFill>
               </a14:hiddenFill>
             </a:ext>
             <a:ext uri="{91240B29-F687-4F45-9708-019B960494DF}">
-              <a14:hiddenLine xmlns:a14="http://schemas.microsoft.com/office/drawing/2010/main" w="9525">
+              <a14:hiddenLine xmlns:a14="http://schemas.microsoft.com/office/drawing/2010/main" xmlns="" w="9525">
                 <a:solidFill>
                   <a:schemeClr val="tx1"/>
                 </a:solidFill>
@@ -15368,7 +15392,7 @@
     </p:spTree>
     <p:extLst>
       <p:ext uri="{BB962C8B-B14F-4D97-AF65-F5344CB8AC3E}">
-        <p14:creationId xmlns:p14="http://schemas.microsoft.com/office/powerpoint/2010/main" val="1340158804"/>
+        <p14:creationId xmlns:p14="http://schemas.microsoft.com/office/powerpoint/2010/main" xmlns="" val="1340158804"/>
       </p:ext>
     </p:extLst>
   </p:cSld>
@@ -15510,7 +15534,7 @@
     </p:spTree>
     <p:extLst>
       <p:ext uri="{BB962C8B-B14F-4D97-AF65-F5344CB8AC3E}">
-        <p14:creationId xmlns:p14="http://schemas.microsoft.com/office/powerpoint/2010/main" val="3319741778"/>
+        <p14:creationId xmlns:p14="http://schemas.microsoft.com/office/powerpoint/2010/main" xmlns="" val="3319741778"/>
       </p:ext>
     </p:extLst>
   </p:cSld>
@@ -15599,12 +15623,12 @@
               <a:t>Aplicativo se provou eficaz para gerar </a:t>
             </a:r>
             <a:r>
-              <a:rPr lang="pt-BR" sz="2800" dirty="0" err="1" smtClean="0"/>
-              <a:t>paineis</a:t>
-            </a:r>
-            <a:r>
               <a:rPr lang="pt-BR" sz="2800" dirty="0" smtClean="0"/>
-              <a:t> gráficos.</a:t>
+              <a:t>painéis </a:t>
+            </a:r>
+            <a:r>
+              <a:rPr lang="pt-BR" sz="2800" dirty="0" smtClean="0"/>
+              <a:t>gráficos.</a:t>
             </a:r>
           </a:p>
           <a:p>
@@ -15646,7 +15670,7 @@
     </p:spTree>
     <p:extLst>
       <p:ext uri="{BB962C8B-B14F-4D97-AF65-F5344CB8AC3E}">
-        <p14:creationId xmlns:p14="http://schemas.microsoft.com/office/powerpoint/2010/main" val="3767888456"/>
+        <p14:creationId xmlns:p14="http://schemas.microsoft.com/office/powerpoint/2010/main" xmlns="" val="3767888456"/>
       </p:ext>
     </p:extLst>
   </p:cSld>
@@ -15774,7 +15798,7 @@
     </p:spTree>
     <p:extLst>
       <p:ext uri="{BB962C8B-B14F-4D97-AF65-F5344CB8AC3E}">
-        <p14:creationId xmlns:p14="http://schemas.microsoft.com/office/powerpoint/2010/main" val="2469554634"/>
+        <p14:creationId xmlns:p14="http://schemas.microsoft.com/office/powerpoint/2010/main" xmlns="" val="2469554634"/>
       </p:ext>
     </p:extLst>
   </p:cSld>
@@ -15910,7 +15934,7 @@
     </p:spTree>
     <p:extLst>
       <p:ext uri="{BB962C8B-B14F-4D97-AF65-F5344CB8AC3E}">
-        <p14:creationId xmlns:p14="http://schemas.microsoft.com/office/powerpoint/2010/main" val="3851679903"/>
+        <p14:creationId xmlns:p14="http://schemas.microsoft.com/office/powerpoint/2010/main" xmlns="" val="3851679903"/>
       </p:ext>
     </p:extLst>
   </p:cSld>
@@ -15974,10 +15998,10 @@
           <p:nvPr/>
         </p:nvPicPr>
         <p:blipFill>
-          <a:blip r:embed="rId2">
+          <a:blip r:embed="rId2" cstate="print">
             <a:extLst>
               <a:ext uri="{28A0092B-C50C-407E-A947-70E740481C1C}">
-                <a14:useLocalDpi xmlns:a14="http://schemas.microsoft.com/office/drawing/2010/main" val="0"/>
+                <a14:useLocalDpi xmlns:a14="http://schemas.microsoft.com/office/drawing/2010/main" xmlns="" val="0"/>
               </a:ext>
             </a:extLst>
           </a:blip>
@@ -15998,7 +16022,7 @@
     </p:spTree>
     <p:extLst>
       <p:ext uri="{BB962C8B-B14F-4D97-AF65-F5344CB8AC3E}">
-        <p14:creationId xmlns:p14="http://schemas.microsoft.com/office/powerpoint/2010/main" val="2611497450"/>
+        <p14:creationId xmlns:p14="http://schemas.microsoft.com/office/powerpoint/2010/main" xmlns="" val="2611497450"/>
       </p:ext>
     </p:extLst>
   </p:cSld>
@@ -16245,7 +16269,7 @@
     </p:spTree>
     <p:extLst>
       <p:ext uri="{BB962C8B-B14F-4D97-AF65-F5344CB8AC3E}">
-        <p14:creationId xmlns:p14="http://schemas.microsoft.com/office/powerpoint/2010/main" val="1343556591"/>
+        <p14:creationId xmlns:p14="http://schemas.microsoft.com/office/powerpoint/2010/main" xmlns="" val="1343556591"/>
       </p:ext>
     </p:extLst>
   </p:cSld>
@@ -16489,7 +16513,7 @@
     </p:spTree>
     <p:extLst>
       <p:ext uri="{BB962C8B-B14F-4D97-AF65-F5344CB8AC3E}">
-        <p14:creationId xmlns:p14="http://schemas.microsoft.com/office/powerpoint/2010/main" val="2518243544"/>
+        <p14:creationId xmlns:p14="http://schemas.microsoft.com/office/powerpoint/2010/main" xmlns="" val="2518243544"/>
       </p:ext>
     </p:extLst>
   </p:cSld>
@@ -16802,7 +16826,7 @@
     </p:spTree>
     <p:extLst>
       <p:ext uri="{BB962C8B-B14F-4D97-AF65-F5344CB8AC3E}">
-        <p14:creationId xmlns:p14="http://schemas.microsoft.com/office/powerpoint/2010/main" val="448647290"/>
+        <p14:creationId xmlns:p14="http://schemas.microsoft.com/office/powerpoint/2010/main" xmlns="" val="448647290"/>
       </p:ext>
     </p:extLst>
   </p:cSld>
@@ -17071,7 +17095,7 @@
     </p:spTree>
     <p:extLst>
       <p:ext uri="{BB962C8B-B14F-4D97-AF65-F5344CB8AC3E}">
-        <p14:creationId xmlns:p14="http://schemas.microsoft.com/office/powerpoint/2010/main" val="3448715097"/>
+        <p14:creationId xmlns:p14="http://schemas.microsoft.com/office/powerpoint/2010/main" xmlns="" val="3448715097"/>
       </p:ext>
     </p:extLst>
   </p:cSld>
@@ -17381,7 +17405,7 @@
     </p:spTree>
     <p:extLst>
       <p:ext uri="{BB962C8B-B14F-4D97-AF65-F5344CB8AC3E}">
-        <p14:creationId xmlns:p14="http://schemas.microsoft.com/office/powerpoint/2010/main" val="4279112136"/>
+        <p14:creationId xmlns:p14="http://schemas.microsoft.com/office/powerpoint/2010/main" xmlns="" val="4279112136"/>
       </p:ext>
     </p:extLst>
   </p:cSld>
@@ -17723,7 +17747,7 @@
     </p:spTree>
     <p:extLst>
       <p:ext uri="{BB962C8B-B14F-4D97-AF65-F5344CB8AC3E}">
-        <p14:creationId xmlns:p14="http://schemas.microsoft.com/office/powerpoint/2010/main" val="1863120352"/>
+        <p14:creationId xmlns:p14="http://schemas.microsoft.com/office/powerpoint/2010/main" xmlns="" val="1863120352"/>
       </p:ext>
     </p:extLst>
   </p:cSld>
@@ -17998,7 +18022,7 @@
     </p:spTree>
     <p:extLst>
       <p:ext uri="{BB962C8B-B14F-4D97-AF65-F5344CB8AC3E}">
-        <p14:creationId xmlns:p14="http://schemas.microsoft.com/office/powerpoint/2010/main" val="1571623878"/>
+        <p14:creationId xmlns:p14="http://schemas.microsoft.com/office/powerpoint/2010/main" xmlns="" val="1571623878"/>
       </p:ext>
     </p:extLst>
   </p:cSld>
@@ -18093,7 +18117,7 @@
     </p:spTree>
     <p:extLst>
       <p:ext uri="{BB962C8B-B14F-4D97-AF65-F5344CB8AC3E}">
-        <p14:creationId xmlns:p14="http://schemas.microsoft.com/office/powerpoint/2010/main" val="775567503"/>
+        <p14:creationId xmlns:p14="http://schemas.microsoft.com/office/powerpoint/2010/main" xmlns="" val="775567503"/>
       </p:ext>
     </p:extLst>
   </p:cSld>
@@ -18452,7 +18476,7 @@
     </p:spTree>
     <p:extLst>
       <p:ext uri="{BB962C8B-B14F-4D97-AF65-F5344CB8AC3E}">
-        <p14:creationId xmlns:p14="http://schemas.microsoft.com/office/powerpoint/2010/main" val="1579538806"/>
+        <p14:creationId xmlns:p14="http://schemas.microsoft.com/office/powerpoint/2010/main" xmlns="" val="1579538806"/>
       </p:ext>
     </p:extLst>
   </p:cSld>
@@ -18895,7 +18919,7 @@
     </p:spTree>
     <p:extLst>
       <p:ext uri="{BB962C8B-B14F-4D97-AF65-F5344CB8AC3E}">
-        <p14:creationId xmlns:p14="http://schemas.microsoft.com/office/powerpoint/2010/main" val="3009619785"/>
+        <p14:creationId xmlns:p14="http://schemas.microsoft.com/office/powerpoint/2010/main" xmlns="" val="3009619785"/>
       </p:ext>
     </p:extLst>
   </p:cSld>
@@ -19163,7 +19187,7 @@
     </p:spTree>
     <p:extLst>
       <p:ext uri="{BB962C8B-B14F-4D97-AF65-F5344CB8AC3E}">
-        <p14:creationId xmlns:p14="http://schemas.microsoft.com/office/powerpoint/2010/main" val="3675531021"/>
+        <p14:creationId xmlns:p14="http://schemas.microsoft.com/office/powerpoint/2010/main" xmlns="" val="3675531021"/>
       </p:ext>
     </p:extLst>
   </p:cSld>
@@ -19463,7 +19487,7 @@
     </p:spTree>
     <p:extLst>
       <p:ext uri="{BB962C8B-B14F-4D97-AF65-F5344CB8AC3E}">
-        <p14:creationId xmlns:p14="http://schemas.microsoft.com/office/powerpoint/2010/main" val="1865845751"/>
+        <p14:creationId xmlns:p14="http://schemas.microsoft.com/office/powerpoint/2010/main" xmlns="" val="1865845751"/>
       </p:ext>
     </p:extLst>
   </p:cSld>

</xml_diff>

<commit_message>
Algumas correções no  PPT
</commit_message>
<xml_diff>
--- a/mono/Defesa TCC - DashGen - FINAL.pptx
+++ b/mono/Defesa TCC - DashGen - FINAL.pptx
@@ -341,7 +341,7 @@
             <a:fld id="{2E700DB3-DBF0-4086-B675-117E7A9610B8}" type="datetimeFigureOut">
               <a:rPr lang="pt-BR" smtClean="0"/>
               <a:pPr/>
-              <a:t>09/03/2020</a:t>
+              <a:t>11/03/2020</a:t>
             </a:fld>
             <a:endParaRPr lang="pt-BR"/>
           </a:p>
@@ -543,7 +543,7 @@
             <a:fld id="{2E700DB3-DBF0-4086-B675-117E7A9610B8}" type="datetimeFigureOut">
               <a:rPr lang="pt-BR" smtClean="0"/>
               <a:pPr/>
-              <a:t>09/03/2020</a:t>
+              <a:t>11/03/2020</a:t>
             </a:fld>
             <a:endParaRPr lang="pt-BR"/>
           </a:p>
@@ -720,7 +720,7 @@
             <a:fld id="{2E700DB3-DBF0-4086-B675-117E7A9610B8}" type="datetimeFigureOut">
               <a:rPr lang="pt-BR" smtClean="0"/>
               <a:pPr/>
-              <a:t>09/03/2020</a:t>
+              <a:t>11/03/2020</a:t>
             </a:fld>
             <a:endParaRPr lang="pt-BR"/>
           </a:p>
@@ -887,7 +887,7 @@
             <a:fld id="{2E700DB3-DBF0-4086-B675-117E7A9610B8}" type="datetimeFigureOut">
               <a:rPr lang="pt-BR" smtClean="0"/>
               <a:pPr/>
-              <a:t>09/03/2020</a:t>
+              <a:t>11/03/2020</a:t>
             </a:fld>
             <a:endParaRPr lang="pt-BR"/>
           </a:p>
@@ -1137,7 +1137,7 @@
             <a:fld id="{2E700DB3-DBF0-4086-B675-117E7A9610B8}" type="datetimeFigureOut">
               <a:rPr lang="pt-BR" smtClean="0"/>
               <a:pPr/>
-              <a:t>09/03/2020</a:t>
+              <a:t>11/03/2020</a:t>
             </a:fld>
             <a:endParaRPr lang="pt-BR"/>
           </a:p>
@@ -1457,7 +1457,7 @@
             <a:fld id="{2E700DB3-DBF0-4086-B675-117E7A9610B8}" type="datetimeFigureOut">
               <a:rPr lang="pt-BR" smtClean="0"/>
               <a:pPr/>
-              <a:t>09/03/2020</a:t>
+              <a:t>11/03/2020</a:t>
             </a:fld>
             <a:endParaRPr lang="pt-BR"/>
           </a:p>
@@ -1925,7 +1925,7 @@
             <a:fld id="{2E700DB3-DBF0-4086-B675-117E7A9610B8}" type="datetimeFigureOut">
               <a:rPr lang="pt-BR" smtClean="0"/>
               <a:pPr/>
-              <a:t>09/03/2020</a:t>
+              <a:t>11/03/2020</a:t>
             </a:fld>
             <a:endParaRPr lang="pt-BR"/>
           </a:p>
@@ -2075,7 +2075,7 @@
             <a:fld id="{2E700DB3-DBF0-4086-B675-117E7A9610B8}" type="datetimeFigureOut">
               <a:rPr lang="pt-BR" smtClean="0"/>
               <a:pPr/>
-              <a:t>09/03/2020</a:t>
+              <a:t>11/03/2020</a:t>
             </a:fld>
             <a:endParaRPr lang="pt-BR"/>
           </a:p>
@@ -2167,7 +2167,7 @@
             <a:fld id="{2E700DB3-DBF0-4086-B675-117E7A9610B8}" type="datetimeFigureOut">
               <a:rPr lang="pt-BR" smtClean="0"/>
               <a:pPr/>
-              <a:t>09/03/2020</a:t>
+              <a:t>11/03/2020</a:t>
             </a:fld>
             <a:endParaRPr lang="pt-BR"/>
           </a:p>
@@ -2443,7 +2443,7 @@
             <a:fld id="{2E700DB3-DBF0-4086-B675-117E7A9610B8}" type="datetimeFigureOut">
               <a:rPr lang="pt-BR" smtClean="0"/>
               <a:pPr/>
-              <a:t>09/03/2020</a:t>
+              <a:t>11/03/2020</a:t>
             </a:fld>
             <a:endParaRPr lang="pt-BR"/>
           </a:p>
@@ -2750,7 +2750,7 @@
             <a:fld id="{2E700DB3-DBF0-4086-B675-117E7A9610B8}" type="datetimeFigureOut">
               <a:rPr lang="pt-BR" smtClean="0"/>
               <a:pPr/>
-              <a:t>09/03/2020</a:t>
+              <a:t>11/03/2020</a:t>
             </a:fld>
             <a:endParaRPr lang="pt-BR"/>
           </a:p>
@@ -3050,7 +3050,7 @@
             <a:fld id="{2E700DB3-DBF0-4086-B675-117E7A9610B8}" type="datetimeFigureOut">
               <a:rPr lang="pt-BR" smtClean="0"/>
               <a:pPr/>
-              <a:t>09/03/2020</a:t>
+              <a:t>11/03/2020</a:t>
             </a:fld>
             <a:endParaRPr lang="pt-BR"/>
           </a:p>
@@ -3770,7 +3770,7 @@
           <a:blip r:embed="rId2" cstate="print">
             <a:extLst>
               <a:ext uri="{28A0092B-C50C-407E-A947-70E740481C1C}">
-                <a14:useLocalDpi xmlns:a14="http://schemas.microsoft.com/office/drawing/2010/main" xmlns="" val="0"/>
+                <a14:useLocalDpi xmlns:a14="http://schemas.microsoft.com/office/drawing/2010/main" val="0"/>
               </a:ext>
             </a:extLst>
           </a:blip>
@@ -3790,7 +3790,7 @@
           <a:noFill/>
           <a:extLst>
             <a:ext uri="{909E8E84-426E-40DD-AFC4-6F175D3DCCD1}">
-              <a14:hiddenFill xmlns:a14="http://schemas.microsoft.com/office/drawing/2010/main" xmlns="">
+              <a14:hiddenFill xmlns:a14="http://schemas.microsoft.com/office/drawing/2010/main">
                 <a:solidFill>
                   <a:srgbClr val="FFFFFF"/>
                 </a:solidFill>
@@ -4019,7 +4019,7 @@
     </p:spTree>
     <p:extLst>
       <p:ext uri="{BB962C8B-B14F-4D97-AF65-F5344CB8AC3E}">
-        <p14:creationId xmlns:p14="http://schemas.microsoft.com/office/powerpoint/2010/main" xmlns="" val="3203044337"/>
+        <p14:creationId xmlns:p14="http://schemas.microsoft.com/office/powerpoint/2010/main" val="3203044337"/>
       </p:ext>
     </p:extLst>
   </p:cSld>
@@ -4168,7 +4168,7 @@
     </p:spTree>
     <p:extLst>
       <p:ext uri="{BB962C8B-B14F-4D97-AF65-F5344CB8AC3E}">
-        <p14:creationId xmlns:p14="http://schemas.microsoft.com/office/powerpoint/2010/main" xmlns="" val="2848151579"/>
+        <p14:creationId xmlns:p14="http://schemas.microsoft.com/office/powerpoint/2010/main" val="2848151579"/>
       </p:ext>
     </p:extLst>
   </p:cSld>
@@ -5094,7 +5094,7 @@
     </p:spTree>
     <p:extLst>
       <p:ext uri="{BB962C8B-B14F-4D97-AF65-F5344CB8AC3E}">
-        <p14:creationId xmlns:p14="http://schemas.microsoft.com/office/powerpoint/2010/main" xmlns="" val="2899401314"/>
+        <p14:creationId xmlns:p14="http://schemas.microsoft.com/office/powerpoint/2010/main" val="2899401314"/>
       </p:ext>
     </p:extLst>
   </p:cSld>
@@ -6154,7 +6154,7 @@
     </p:spTree>
     <p:extLst>
       <p:ext uri="{BB962C8B-B14F-4D97-AF65-F5344CB8AC3E}">
-        <p14:creationId xmlns:p14="http://schemas.microsoft.com/office/powerpoint/2010/main" xmlns="" val="50472887"/>
+        <p14:creationId xmlns:p14="http://schemas.microsoft.com/office/powerpoint/2010/main" val="50472887"/>
       </p:ext>
     </p:extLst>
   </p:cSld>
@@ -6348,7 +6348,7 @@
           <a:blip r:embed="rId2" cstate="print">
             <a:extLst>
               <a:ext uri="{28A0092B-C50C-407E-A947-70E740481C1C}">
-                <a14:useLocalDpi xmlns:a14="http://schemas.microsoft.com/office/drawing/2010/main" xmlns="" val="0"/>
+                <a14:useLocalDpi xmlns:a14="http://schemas.microsoft.com/office/drawing/2010/main" val="0"/>
               </a:ext>
             </a:extLst>
           </a:blip>
@@ -6369,7 +6369,7 @@
     </p:spTree>
     <p:extLst>
       <p:ext uri="{BB962C8B-B14F-4D97-AF65-F5344CB8AC3E}">
-        <p14:creationId xmlns:p14="http://schemas.microsoft.com/office/powerpoint/2010/main" xmlns="" val="966469963"/>
+        <p14:creationId xmlns:p14="http://schemas.microsoft.com/office/powerpoint/2010/main" val="966469963"/>
       </p:ext>
     </p:extLst>
   </p:cSld>
@@ -6624,7 +6624,7 @@
     </p:spTree>
     <p:extLst>
       <p:ext uri="{BB962C8B-B14F-4D97-AF65-F5344CB8AC3E}">
-        <p14:creationId xmlns:p14="http://schemas.microsoft.com/office/powerpoint/2010/main" xmlns="" val="1162597756"/>
+        <p14:creationId xmlns:p14="http://schemas.microsoft.com/office/powerpoint/2010/main" val="1162597756"/>
       </p:ext>
     </p:extLst>
   </p:cSld>
@@ -7055,7 +7055,7 @@
     </p:spTree>
     <p:extLst>
       <p:ext uri="{BB962C8B-B14F-4D97-AF65-F5344CB8AC3E}">
-        <p14:creationId xmlns:p14="http://schemas.microsoft.com/office/powerpoint/2010/main" xmlns="" val="3771295850"/>
+        <p14:creationId xmlns:p14="http://schemas.microsoft.com/office/powerpoint/2010/main" val="3771295850"/>
       </p:ext>
     </p:extLst>
   </p:cSld>
@@ -8124,7 +8124,7 @@
     </p:spTree>
     <p:extLst>
       <p:ext uri="{BB962C8B-B14F-4D97-AF65-F5344CB8AC3E}">
-        <p14:creationId xmlns:p14="http://schemas.microsoft.com/office/powerpoint/2010/main" xmlns="" val="2360740904"/>
+        <p14:creationId xmlns:p14="http://schemas.microsoft.com/office/powerpoint/2010/main" val="2360740904"/>
       </p:ext>
     </p:extLst>
   </p:cSld>
@@ -9670,7 +9670,7 @@
     </p:spTree>
     <p:extLst>
       <p:ext uri="{BB962C8B-B14F-4D97-AF65-F5344CB8AC3E}">
-        <p14:creationId xmlns:p14="http://schemas.microsoft.com/office/powerpoint/2010/main" xmlns="" val="2053396683"/>
+        <p14:creationId xmlns:p14="http://schemas.microsoft.com/office/powerpoint/2010/main" val="2053396683"/>
       </p:ext>
     </p:extLst>
   </p:cSld>
@@ -10363,7 +10363,7 @@
     </p:spTree>
     <p:extLst>
       <p:ext uri="{BB962C8B-B14F-4D97-AF65-F5344CB8AC3E}">
-        <p14:creationId xmlns:p14="http://schemas.microsoft.com/office/powerpoint/2010/main" xmlns="" val="749781141"/>
+        <p14:creationId xmlns:p14="http://schemas.microsoft.com/office/powerpoint/2010/main" val="749781141"/>
       </p:ext>
     </p:extLst>
   </p:cSld>
@@ -10988,7 +10988,7 @@
     </p:spTree>
     <p:extLst>
       <p:ext uri="{BB962C8B-B14F-4D97-AF65-F5344CB8AC3E}">
-        <p14:creationId xmlns:p14="http://schemas.microsoft.com/office/powerpoint/2010/main" xmlns="" val="40006603"/>
+        <p14:creationId xmlns:p14="http://schemas.microsoft.com/office/powerpoint/2010/main" val="40006603"/>
       </p:ext>
     </p:extLst>
   </p:cSld>
@@ -11350,6 +11350,10 @@
               <a:rPr lang="pt-BR" sz="2800" b="1" dirty="0"/>
               <a:t>facilitam o entendimento de conjuntos de dados volumosos. </a:t>
             </a:r>
+            <a:r>
+              <a:rPr lang="pt-BR" sz="2800" b="1" dirty="0" smtClean="0"/>
+              <a:t>Porém ainda é bastante trabalhoso construí-los um a um.</a:t>
+            </a:r>
             <a:endParaRPr lang="pt-BR" sz="2800" b="1" dirty="0" smtClean="0"/>
           </a:p>
           <a:p>
@@ -11372,7 +11376,7 @@
     </p:spTree>
     <p:extLst>
       <p:ext uri="{BB962C8B-B14F-4D97-AF65-F5344CB8AC3E}">
-        <p14:creationId xmlns:p14="http://schemas.microsoft.com/office/powerpoint/2010/main" xmlns="" val="3742307202"/>
+        <p14:creationId xmlns:p14="http://schemas.microsoft.com/office/powerpoint/2010/main" val="3742307202"/>
       </p:ext>
     </p:extLst>
   </p:cSld>
@@ -11695,7 +11699,7 @@
     </p:spTree>
     <p:extLst>
       <p:ext uri="{BB962C8B-B14F-4D97-AF65-F5344CB8AC3E}">
-        <p14:creationId xmlns:p14="http://schemas.microsoft.com/office/powerpoint/2010/main" xmlns="" val="706922232"/>
+        <p14:creationId xmlns:p14="http://schemas.microsoft.com/office/powerpoint/2010/main" val="706922232"/>
       </p:ext>
     </p:extLst>
   </p:cSld>
@@ -12256,7 +12260,7 @@
     </p:spTree>
     <p:extLst>
       <p:ext uri="{BB962C8B-B14F-4D97-AF65-F5344CB8AC3E}">
-        <p14:creationId xmlns:p14="http://schemas.microsoft.com/office/powerpoint/2010/main" xmlns="" val="1649903801"/>
+        <p14:creationId xmlns:p14="http://schemas.microsoft.com/office/powerpoint/2010/main" val="1649903801"/>
       </p:ext>
     </p:extLst>
   </p:cSld>
@@ -12540,7 +12544,7 @@
           <a:blip r:embed="rId2" cstate="print">
             <a:extLst>
               <a:ext uri="{28A0092B-C50C-407E-A947-70E740481C1C}">
-                <a14:useLocalDpi xmlns:a14="http://schemas.microsoft.com/office/drawing/2010/main" xmlns="" val="0"/>
+                <a14:useLocalDpi xmlns:a14="http://schemas.microsoft.com/office/drawing/2010/main" val="0"/>
               </a:ext>
             </a:extLst>
           </a:blip>
@@ -12563,14 +12567,14 @@
           </a:ln>
           <a:extLst>
             <a:ext uri="{909E8E84-426E-40DD-AFC4-6F175D3DCCD1}">
-              <a14:hiddenFill xmlns:a14="http://schemas.microsoft.com/office/drawing/2010/main" xmlns="">
+              <a14:hiddenFill xmlns:a14="http://schemas.microsoft.com/office/drawing/2010/main">
                 <a:solidFill>
                   <a:schemeClr val="accent1"/>
                 </a:solidFill>
               </a14:hiddenFill>
             </a:ext>
             <a:ext uri="{91240B29-F687-4F45-9708-019B960494DF}">
-              <a14:hiddenLine xmlns:a14="http://schemas.microsoft.com/office/drawing/2010/main" xmlns="" w="9525">
+              <a14:hiddenLine xmlns:a14="http://schemas.microsoft.com/office/drawing/2010/main" w="9525">
                 <a:solidFill>
                   <a:schemeClr val="tx1"/>
                 </a:solidFill>
@@ -12585,7 +12589,7 @@
     </p:spTree>
     <p:extLst>
       <p:ext uri="{BB962C8B-B14F-4D97-AF65-F5344CB8AC3E}">
-        <p14:creationId xmlns:p14="http://schemas.microsoft.com/office/powerpoint/2010/main" xmlns="" val="3966991713"/>
+        <p14:creationId xmlns:p14="http://schemas.microsoft.com/office/powerpoint/2010/main" val="3966991713"/>
       </p:ext>
     </p:extLst>
   </p:cSld>
@@ -12848,7 +12852,7 @@
     </p:spTree>
     <p:extLst>
       <p:ext uri="{BB962C8B-B14F-4D97-AF65-F5344CB8AC3E}">
-        <p14:creationId xmlns:p14="http://schemas.microsoft.com/office/powerpoint/2010/main" xmlns="" val="1163120309"/>
+        <p14:creationId xmlns:p14="http://schemas.microsoft.com/office/powerpoint/2010/main" val="1163120309"/>
       </p:ext>
     </p:extLst>
   </p:cSld>
@@ -13085,7 +13089,7 @@
           <a:blip r:embed="rId2" cstate="print">
             <a:extLst>
               <a:ext uri="{28A0092B-C50C-407E-A947-70E740481C1C}">
-                <a14:useLocalDpi xmlns:a14="http://schemas.microsoft.com/office/drawing/2010/main" xmlns="" val="0"/>
+                <a14:useLocalDpi xmlns:a14="http://schemas.microsoft.com/office/drawing/2010/main" val="0"/>
               </a:ext>
             </a:extLst>
           </a:blip>
@@ -13111,7 +13115,7 @@
     </p:spTree>
     <p:extLst>
       <p:ext uri="{BB962C8B-B14F-4D97-AF65-F5344CB8AC3E}">
-        <p14:creationId xmlns:p14="http://schemas.microsoft.com/office/powerpoint/2010/main" xmlns="" val="2830176727"/>
+        <p14:creationId xmlns:p14="http://schemas.microsoft.com/office/powerpoint/2010/main" val="2830176727"/>
       </p:ext>
     </p:extLst>
   </p:cSld>
@@ -13203,7 +13207,7 @@
           <a:blip r:embed="rId2" cstate="print">
             <a:extLst>
               <a:ext uri="{28A0092B-C50C-407E-A947-70E740481C1C}">
-                <a14:useLocalDpi xmlns:a14="http://schemas.microsoft.com/office/drawing/2010/main" xmlns="" val="0"/>
+                <a14:useLocalDpi xmlns:a14="http://schemas.microsoft.com/office/drawing/2010/main" val="0"/>
               </a:ext>
             </a:extLst>
           </a:blip>
@@ -13229,7 +13233,7 @@
     </p:spTree>
     <p:extLst>
       <p:ext uri="{BB962C8B-B14F-4D97-AF65-F5344CB8AC3E}">
-        <p14:creationId xmlns:p14="http://schemas.microsoft.com/office/powerpoint/2010/main" xmlns="" val="447413865"/>
+        <p14:creationId xmlns:p14="http://schemas.microsoft.com/office/powerpoint/2010/main" val="447413865"/>
       </p:ext>
     </p:extLst>
   </p:cSld>
@@ -13321,7 +13325,7 @@
           <a:blip r:embed="rId2" cstate="print">
             <a:extLst>
               <a:ext uri="{28A0092B-C50C-407E-A947-70E740481C1C}">
-                <a14:useLocalDpi xmlns:a14="http://schemas.microsoft.com/office/drawing/2010/main" xmlns="" val="0"/>
+                <a14:useLocalDpi xmlns:a14="http://schemas.microsoft.com/office/drawing/2010/main" val="0"/>
               </a:ext>
             </a:extLst>
           </a:blip>
@@ -13347,7 +13351,7 @@
     </p:spTree>
     <p:extLst>
       <p:ext uri="{BB962C8B-B14F-4D97-AF65-F5344CB8AC3E}">
-        <p14:creationId xmlns:p14="http://schemas.microsoft.com/office/powerpoint/2010/main" xmlns="" val="3798993823"/>
+        <p14:creationId xmlns:p14="http://schemas.microsoft.com/office/powerpoint/2010/main" val="3798993823"/>
       </p:ext>
     </p:extLst>
   </p:cSld>
@@ -13473,7 +13477,7 @@
     </p:spTree>
     <p:extLst>
       <p:ext uri="{BB962C8B-B14F-4D97-AF65-F5344CB8AC3E}">
-        <p14:creationId xmlns:p14="http://schemas.microsoft.com/office/powerpoint/2010/main" xmlns="" val="1719666060"/>
+        <p14:creationId xmlns:p14="http://schemas.microsoft.com/office/powerpoint/2010/main" val="1719666060"/>
       </p:ext>
     </p:extLst>
   </p:cSld>
@@ -13760,7 +13764,7 @@
           <a:blip r:embed="rId2" cstate="print">
             <a:extLst>
               <a:ext uri="{28A0092B-C50C-407E-A947-70E740481C1C}">
-                <a14:useLocalDpi xmlns:a14="http://schemas.microsoft.com/office/drawing/2010/main" xmlns="" val="0"/>
+                <a14:useLocalDpi xmlns:a14="http://schemas.microsoft.com/office/drawing/2010/main" val="0"/>
               </a:ext>
             </a:extLst>
           </a:blip>
@@ -13783,14 +13787,14 @@
           </a:ln>
           <a:extLst>
             <a:ext uri="{909E8E84-426E-40DD-AFC4-6F175D3DCCD1}">
-              <a14:hiddenFill xmlns:a14="http://schemas.microsoft.com/office/drawing/2010/main" xmlns="">
+              <a14:hiddenFill xmlns:a14="http://schemas.microsoft.com/office/drawing/2010/main">
                 <a:solidFill>
                   <a:schemeClr val="accent1"/>
                 </a:solidFill>
               </a14:hiddenFill>
             </a:ext>
             <a:ext uri="{91240B29-F687-4F45-9708-019B960494DF}">
-              <a14:hiddenLine xmlns:a14="http://schemas.microsoft.com/office/drawing/2010/main" xmlns="" w="9525">
+              <a14:hiddenLine xmlns:a14="http://schemas.microsoft.com/office/drawing/2010/main" w="9525">
                 <a:solidFill>
                   <a:schemeClr val="tx1"/>
                 </a:solidFill>
@@ -13805,7 +13809,7 @@
     </p:spTree>
     <p:extLst>
       <p:ext uri="{BB962C8B-B14F-4D97-AF65-F5344CB8AC3E}">
-        <p14:creationId xmlns:p14="http://schemas.microsoft.com/office/powerpoint/2010/main" xmlns="" val="596928897"/>
+        <p14:creationId xmlns:p14="http://schemas.microsoft.com/office/powerpoint/2010/main" val="596928897"/>
       </p:ext>
     </p:extLst>
   </p:cSld>
@@ -13947,7 +13951,7 @@
     </p:spTree>
     <p:extLst>
       <p:ext uri="{BB962C8B-B14F-4D97-AF65-F5344CB8AC3E}">
-        <p14:creationId xmlns:p14="http://schemas.microsoft.com/office/powerpoint/2010/main" xmlns="" val="2239382176"/>
+        <p14:creationId xmlns:p14="http://schemas.microsoft.com/office/powerpoint/2010/main" val="2239382176"/>
       </p:ext>
     </p:extLst>
   </p:cSld>
@@ -14195,7 +14199,7 @@
     </p:spTree>
     <p:extLst>
       <p:ext uri="{BB962C8B-B14F-4D97-AF65-F5344CB8AC3E}">
-        <p14:creationId xmlns:p14="http://schemas.microsoft.com/office/powerpoint/2010/main" xmlns="" val="3796481092"/>
+        <p14:creationId xmlns:p14="http://schemas.microsoft.com/office/powerpoint/2010/main" val="3796481092"/>
       </p:ext>
     </p:extLst>
   </p:cSld>
@@ -14511,7 +14515,7 @@
           <a:blip r:embed="rId2" cstate="print">
             <a:extLst>
               <a:ext uri="{28A0092B-C50C-407E-A947-70E740481C1C}">
-                <a14:useLocalDpi xmlns:a14="http://schemas.microsoft.com/office/drawing/2010/main" xmlns="" val="0"/>
+                <a14:useLocalDpi xmlns:a14="http://schemas.microsoft.com/office/drawing/2010/main" val="0"/>
               </a:ext>
             </a:extLst>
           </a:blip>
@@ -14534,14 +14538,14 @@
           </a:ln>
           <a:extLst>
             <a:ext uri="{909E8E84-426E-40DD-AFC4-6F175D3DCCD1}">
-              <a14:hiddenFill xmlns:a14="http://schemas.microsoft.com/office/drawing/2010/main" xmlns="">
+              <a14:hiddenFill xmlns:a14="http://schemas.microsoft.com/office/drawing/2010/main">
                 <a:solidFill>
                   <a:schemeClr val="accent1"/>
                 </a:solidFill>
               </a14:hiddenFill>
             </a:ext>
             <a:ext uri="{91240B29-F687-4F45-9708-019B960494DF}">
-              <a14:hiddenLine xmlns:a14="http://schemas.microsoft.com/office/drawing/2010/main" xmlns="" w="9525">
+              <a14:hiddenLine xmlns:a14="http://schemas.microsoft.com/office/drawing/2010/main" w="9525">
                 <a:solidFill>
                   <a:schemeClr val="tx1"/>
                 </a:solidFill>
@@ -14588,7 +14592,7 @@
     </p:spTree>
     <p:extLst>
       <p:ext uri="{BB962C8B-B14F-4D97-AF65-F5344CB8AC3E}">
-        <p14:creationId xmlns:p14="http://schemas.microsoft.com/office/powerpoint/2010/main" xmlns="" val="1782519753"/>
+        <p14:creationId xmlns:p14="http://schemas.microsoft.com/office/powerpoint/2010/main" val="1782519753"/>
       </p:ext>
     </p:extLst>
   </p:cSld>
@@ -14701,7 +14705,7 @@
     </p:spTree>
     <p:extLst>
       <p:ext uri="{BB962C8B-B14F-4D97-AF65-F5344CB8AC3E}">
-        <p14:creationId xmlns:p14="http://schemas.microsoft.com/office/powerpoint/2010/main" xmlns="" val="1219522875"/>
+        <p14:creationId xmlns:p14="http://schemas.microsoft.com/office/powerpoint/2010/main" val="1219522875"/>
       </p:ext>
     </p:extLst>
   </p:cSld>
@@ -14924,7 +14928,7 @@
           <a:blip r:embed="rId2" cstate="print">
             <a:extLst>
               <a:ext uri="{28A0092B-C50C-407E-A947-70E740481C1C}">
-                <a14:useLocalDpi xmlns:a14="http://schemas.microsoft.com/office/drawing/2010/main" xmlns="" val="0"/>
+                <a14:useLocalDpi xmlns:a14="http://schemas.microsoft.com/office/drawing/2010/main" val="0"/>
               </a:ext>
             </a:extLst>
           </a:blip>
@@ -14947,14 +14951,14 @@
           </a:ln>
           <a:extLst>
             <a:ext uri="{909E8E84-426E-40DD-AFC4-6F175D3DCCD1}">
-              <a14:hiddenFill xmlns:a14="http://schemas.microsoft.com/office/drawing/2010/main" xmlns="">
+              <a14:hiddenFill xmlns:a14="http://schemas.microsoft.com/office/drawing/2010/main">
                 <a:solidFill>
                   <a:schemeClr val="accent1"/>
                 </a:solidFill>
               </a14:hiddenFill>
             </a:ext>
             <a:ext uri="{91240B29-F687-4F45-9708-019B960494DF}">
-              <a14:hiddenLine xmlns:a14="http://schemas.microsoft.com/office/drawing/2010/main" xmlns="" w="9525">
+              <a14:hiddenLine xmlns:a14="http://schemas.microsoft.com/office/drawing/2010/main" w="9525">
                 <a:solidFill>
                   <a:schemeClr val="tx1"/>
                 </a:solidFill>
@@ -14969,7 +14973,7 @@
     </p:spTree>
     <p:extLst>
       <p:ext uri="{BB962C8B-B14F-4D97-AF65-F5344CB8AC3E}">
-        <p14:creationId xmlns:p14="http://schemas.microsoft.com/office/powerpoint/2010/main" xmlns="" val="4005482876"/>
+        <p14:creationId xmlns:p14="http://schemas.microsoft.com/office/powerpoint/2010/main" val="4005482876"/>
       </p:ext>
     </p:extLst>
   </p:cSld>
@@ -15047,7 +15051,7 @@
           <a:blip r:embed="rId2" cstate="print">
             <a:extLst>
               <a:ext uri="{28A0092B-C50C-407E-A947-70E740481C1C}">
-                <a14:useLocalDpi xmlns:a14="http://schemas.microsoft.com/office/drawing/2010/main" xmlns="" val="0"/>
+                <a14:useLocalDpi xmlns:a14="http://schemas.microsoft.com/office/drawing/2010/main" val="0"/>
               </a:ext>
             </a:extLst>
           </a:blip>
@@ -15070,14 +15074,14 @@
           </a:ln>
           <a:extLst>
             <a:ext uri="{909E8E84-426E-40DD-AFC4-6F175D3DCCD1}">
-              <a14:hiddenFill xmlns:a14="http://schemas.microsoft.com/office/drawing/2010/main" xmlns="">
+              <a14:hiddenFill xmlns:a14="http://schemas.microsoft.com/office/drawing/2010/main">
                 <a:solidFill>
                   <a:schemeClr val="accent1"/>
                 </a:solidFill>
               </a14:hiddenFill>
             </a:ext>
             <a:ext uri="{91240B29-F687-4F45-9708-019B960494DF}">
-              <a14:hiddenLine xmlns:a14="http://schemas.microsoft.com/office/drawing/2010/main" xmlns="" w="9525">
+              <a14:hiddenLine xmlns:a14="http://schemas.microsoft.com/office/drawing/2010/main" w="9525">
                 <a:solidFill>
                   <a:schemeClr val="tx1"/>
                 </a:solidFill>
@@ -15101,7 +15105,7 @@
           <a:blip r:embed="rId3" cstate="print">
             <a:extLst>
               <a:ext uri="{28A0092B-C50C-407E-A947-70E740481C1C}">
-                <a14:useLocalDpi xmlns:a14="http://schemas.microsoft.com/office/drawing/2010/main" xmlns="" val="0"/>
+                <a14:useLocalDpi xmlns:a14="http://schemas.microsoft.com/office/drawing/2010/main" val="0"/>
               </a:ext>
             </a:extLst>
           </a:blip>
@@ -15124,14 +15128,14 @@
           </a:ln>
           <a:extLst>
             <a:ext uri="{909E8E84-426E-40DD-AFC4-6F175D3DCCD1}">
-              <a14:hiddenFill xmlns:a14="http://schemas.microsoft.com/office/drawing/2010/main" xmlns="">
+              <a14:hiddenFill xmlns:a14="http://schemas.microsoft.com/office/drawing/2010/main">
                 <a:solidFill>
                   <a:schemeClr val="accent1"/>
                 </a:solidFill>
               </a14:hiddenFill>
             </a:ext>
             <a:ext uri="{91240B29-F687-4F45-9708-019B960494DF}">
-              <a14:hiddenLine xmlns:a14="http://schemas.microsoft.com/office/drawing/2010/main" xmlns="" w="9525">
+              <a14:hiddenLine xmlns:a14="http://schemas.microsoft.com/office/drawing/2010/main" w="9525">
                 <a:solidFill>
                   <a:schemeClr val="tx1"/>
                 </a:solidFill>
@@ -15146,7 +15150,7 @@
     </p:spTree>
     <p:extLst>
       <p:ext uri="{BB962C8B-B14F-4D97-AF65-F5344CB8AC3E}">
-        <p14:creationId xmlns:p14="http://schemas.microsoft.com/office/powerpoint/2010/main" xmlns="" val="2703448726"/>
+        <p14:creationId xmlns:p14="http://schemas.microsoft.com/office/powerpoint/2010/main" val="2703448726"/>
       </p:ext>
     </p:extLst>
   </p:cSld>
@@ -15224,7 +15228,7 @@
           <a:blip r:embed="rId2" cstate="print">
             <a:extLst>
               <a:ext uri="{28A0092B-C50C-407E-A947-70E740481C1C}">
-                <a14:useLocalDpi xmlns:a14="http://schemas.microsoft.com/office/drawing/2010/main" xmlns="" val="0"/>
+                <a14:useLocalDpi xmlns:a14="http://schemas.microsoft.com/office/drawing/2010/main" val="0"/>
               </a:ext>
             </a:extLst>
           </a:blip>
@@ -15247,14 +15251,14 @@
           </a:ln>
           <a:extLst>
             <a:ext uri="{909E8E84-426E-40DD-AFC4-6F175D3DCCD1}">
-              <a14:hiddenFill xmlns:a14="http://schemas.microsoft.com/office/drawing/2010/main" xmlns="">
+              <a14:hiddenFill xmlns:a14="http://schemas.microsoft.com/office/drawing/2010/main">
                 <a:solidFill>
                   <a:schemeClr val="accent1"/>
                 </a:solidFill>
               </a14:hiddenFill>
             </a:ext>
             <a:ext uri="{91240B29-F687-4F45-9708-019B960494DF}">
-              <a14:hiddenLine xmlns:a14="http://schemas.microsoft.com/office/drawing/2010/main" xmlns="" w="9525">
+              <a14:hiddenLine xmlns:a14="http://schemas.microsoft.com/office/drawing/2010/main" w="9525">
                 <a:solidFill>
                   <a:schemeClr val="tx1"/>
                 </a:solidFill>
@@ -15269,7 +15273,7 @@
     </p:spTree>
     <p:extLst>
       <p:ext uri="{BB962C8B-B14F-4D97-AF65-F5344CB8AC3E}">
-        <p14:creationId xmlns:p14="http://schemas.microsoft.com/office/powerpoint/2010/main" xmlns="" val="131747850"/>
+        <p14:creationId xmlns:p14="http://schemas.microsoft.com/office/powerpoint/2010/main" val="131747850"/>
       </p:ext>
     </p:extLst>
   </p:cSld>
@@ -15347,7 +15351,7 @@
           <a:blip r:embed="rId2" cstate="print">
             <a:extLst>
               <a:ext uri="{28A0092B-C50C-407E-A947-70E740481C1C}">
-                <a14:useLocalDpi xmlns:a14="http://schemas.microsoft.com/office/drawing/2010/main" xmlns="" val="0"/>
+                <a14:useLocalDpi xmlns:a14="http://schemas.microsoft.com/office/drawing/2010/main" val="0"/>
               </a:ext>
             </a:extLst>
           </a:blip>
@@ -15370,14 +15374,14 @@
           </a:ln>
           <a:extLst>
             <a:ext uri="{909E8E84-426E-40DD-AFC4-6F175D3DCCD1}">
-              <a14:hiddenFill xmlns:a14="http://schemas.microsoft.com/office/drawing/2010/main" xmlns="">
+              <a14:hiddenFill xmlns:a14="http://schemas.microsoft.com/office/drawing/2010/main">
                 <a:solidFill>
                   <a:schemeClr val="accent1"/>
                 </a:solidFill>
               </a14:hiddenFill>
             </a:ext>
             <a:ext uri="{91240B29-F687-4F45-9708-019B960494DF}">
-              <a14:hiddenLine xmlns:a14="http://schemas.microsoft.com/office/drawing/2010/main" xmlns="" w="9525">
+              <a14:hiddenLine xmlns:a14="http://schemas.microsoft.com/office/drawing/2010/main" w="9525">
                 <a:solidFill>
                   <a:schemeClr val="tx1"/>
                 </a:solidFill>
@@ -15392,7 +15396,7 @@
     </p:spTree>
     <p:extLst>
       <p:ext uri="{BB962C8B-B14F-4D97-AF65-F5344CB8AC3E}">
-        <p14:creationId xmlns:p14="http://schemas.microsoft.com/office/powerpoint/2010/main" xmlns="" val="1340158804"/>
+        <p14:creationId xmlns:p14="http://schemas.microsoft.com/office/powerpoint/2010/main" val="1340158804"/>
       </p:ext>
     </p:extLst>
   </p:cSld>
@@ -15534,7 +15538,7 @@
     </p:spTree>
     <p:extLst>
       <p:ext uri="{BB962C8B-B14F-4D97-AF65-F5344CB8AC3E}">
-        <p14:creationId xmlns:p14="http://schemas.microsoft.com/office/powerpoint/2010/main" xmlns="" val="3319741778"/>
+        <p14:creationId xmlns:p14="http://schemas.microsoft.com/office/powerpoint/2010/main" val="3319741778"/>
       </p:ext>
     </p:extLst>
   </p:cSld>
@@ -15620,15 +15624,7 @@
             </a:pPr>
             <a:r>
               <a:rPr lang="pt-BR" sz="2800" dirty="0" smtClean="0"/>
-              <a:t>Aplicativo se provou eficaz para gerar </a:t>
-            </a:r>
-            <a:r>
-              <a:rPr lang="pt-BR" sz="2800" dirty="0" smtClean="0"/>
-              <a:t>painéis </a:t>
-            </a:r>
-            <a:r>
-              <a:rPr lang="pt-BR" sz="2800" dirty="0" smtClean="0"/>
-              <a:t>gráficos.</a:t>
+              <a:t>Aplicativo se provou eficaz para gerar painéis gráficos.</a:t>
             </a:r>
           </a:p>
           <a:p>
@@ -15670,7 +15666,7 @@
     </p:spTree>
     <p:extLst>
       <p:ext uri="{BB962C8B-B14F-4D97-AF65-F5344CB8AC3E}">
-        <p14:creationId xmlns:p14="http://schemas.microsoft.com/office/powerpoint/2010/main" xmlns="" val="3767888456"/>
+        <p14:creationId xmlns:p14="http://schemas.microsoft.com/office/powerpoint/2010/main" val="3767888456"/>
       </p:ext>
     </p:extLst>
   </p:cSld>
@@ -15798,7 +15794,7 @@
     </p:spTree>
     <p:extLst>
       <p:ext uri="{BB962C8B-B14F-4D97-AF65-F5344CB8AC3E}">
-        <p14:creationId xmlns:p14="http://schemas.microsoft.com/office/powerpoint/2010/main" xmlns="" val="2469554634"/>
+        <p14:creationId xmlns:p14="http://schemas.microsoft.com/office/powerpoint/2010/main" val="2469554634"/>
       </p:ext>
     </p:extLst>
   </p:cSld>
@@ -15934,7 +15930,7 @@
     </p:spTree>
     <p:extLst>
       <p:ext uri="{BB962C8B-B14F-4D97-AF65-F5344CB8AC3E}">
-        <p14:creationId xmlns:p14="http://schemas.microsoft.com/office/powerpoint/2010/main" xmlns="" val="3851679903"/>
+        <p14:creationId xmlns:p14="http://schemas.microsoft.com/office/powerpoint/2010/main" val="3851679903"/>
       </p:ext>
     </p:extLst>
   </p:cSld>
@@ -16001,7 +15997,7 @@
           <a:blip r:embed="rId2" cstate="print">
             <a:extLst>
               <a:ext uri="{28A0092B-C50C-407E-A947-70E740481C1C}">
-                <a14:useLocalDpi xmlns:a14="http://schemas.microsoft.com/office/drawing/2010/main" xmlns="" val="0"/>
+                <a14:useLocalDpi xmlns:a14="http://schemas.microsoft.com/office/drawing/2010/main" val="0"/>
               </a:ext>
             </a:extLst>
           </a:blip>
@@ -16022,7 +16018,7 @@
     </p:spTree>
     <p:extLst>
       <p:ext uri="{BB962C8B-B14F-4D97-AF65-F5344CB8AC3E}">
-        <p14:creationId xmlns:p14="http://schemas.microsoft.com/office/powerpoint/2010/main" xmlns="" val="2611497450"/>
+        <p14:creationId xmlns:p14="http://schemas.microsoft.com/office/powerpoint/2010/main" val="2611497450"/>
       </p:ext>
     </p:extLst>
   </p:cSld>
@@ -16269,7 +16265,7 @@
     </p:spTree>
     <p:extLst>
       <p:ext uri="{BB962C8B-B14F-4D97-AF65-F5344CB8AC3E}">
-        <p14:creationId xmlns:p14="http://schemas.microsoft.com/office/powerpoint/2010/main" xmlns="" val="1343556591"/>
+        <p14:creationId xmlns:p14="http://schemas.microsoft.com/office/powerpoint/2010/main" val="1343556591"/>
       </p:ext>
     </p:extLst>
   </p:cSld>
@@ -16513,7 +16509,7 @@
     </p:spTree>
     <p:extLst>
       <p:ext uri="{BB962C8B-B14F-4D97-AF65-F5344CB8AC3E}">
-        <p14:creationId xmlns:p14="http://schemas.microsoft.com/office/powerpoint/2010/main" xmlns="" val="2518243544"/>
+        <p14:creationId xmlns:p14="http://schemas.microsoft.com/office/powerpoint/2010/main" val="2518243544"/>
       </p:ext>
     </p:extLst>
   </p:cSld>
@@ -16826,7 +16822,7 @@
     </p:spTree>
     <p:extLst>
       <p:ext uri="{BB962C8B-B14F-4D97-AF65-F5344CB8AC3E}">
-        <p14:creationId xmlns:p14="http://schemas.microsoft.com/office/powerpoint/2010/main" xmlns="" val="448647290"/>
+        <p14:creationId xmlns:p14="http://schemas.microsoft.com/office/powerpoint/2010/main" val="448647290"/>
       </p:ext>
     </p:extLst>
   </p:cSld>
@@ -17095,7 +17091,7 @@
     </p:spTree>
     <p:extLst>
       <p:ext uri="{BB962C8B-B14F-4D97-AF65-F5344CB8AC3E}">
-        <p14:creationId xmlns:p14="http://schemas.microsoft.com/office/powerpoint/2010/main" xmlns="" val="3448715097"/>
+        <p14:creationId xmlns:p14="http://schemas.microsoft.com/office/powerpoint/2010/main" val="3448715097"/>
       </p:ext>
     </p:extLst>
   </p:cSld>
@@ -17405,7 +17401,7 @@
     </p:spTree>
     <p:extLst>
       <p:ext uri="{BB962C8B-B14F-4D97-AF65-F5344CB8AC3E}">
-        <p14:creationId xmlns:p14="http://schemas.microsoft.com/office/powerpoint/2010/main" xmlns="" val="4279112136"/>
+        <p14:creationId xmlns:p14="http://schemas.microsoft.com/office/powerpoint/2010/main" val="4279112136"/>
       </p:ext>
     </p:extLst>
   </p:cSld>
@@ -17747,7 +17743,7 @@
     </p:spTree>
     <p:extLst>
       <p:ext uri="{BB962C8B-B14F-4D97-AF65-F5344CB8AC3E}">
-        <p14:creationId xmlns:p14="http://schemas.microsoft.com/office/powerpoint/2010/main" xmlns="" val="1863120352"/>
+        <p14:creationId xmlns:p14="http://schemas.microsoft.com/office/powerpoint/2010/main" val="1863120352"/>
       </p:ext>
     </p:extLst>
   </p:cSld>
@@ -18022,7 +18018,7 @@
     </p:spTree>
     <p:extLst>
       <p:ext uri="{BB962C8B-B14F-4D97-AF65-F5344CB8AC3E}">
-        <p14:creationId xmlns:p14="http://schemas.microsoft.com/office/powerpoint/2010/main" xmlns="" val="1571623878"/>
+        <p14:creationId xmlns:p14="http://schemas.microsoft.com/office/powerpoint/2010/main" val="1571623878"/>
       </p:ext>
     </p:extLst>
   </p:cSld>
@@ -18117,7 +18113,7 @@
     </p:spTree>
     <p:extLst>
       <p:ext uri="{BB962C8B-B14F-4D97-AF65-F5344CB8AC3E}">
-        <p14:creationId xmlns:p14="http://schemas.microsoft.com/office/powerpoint/2010/main" xmlns="" val="775567503"/>
+        <p14:creationId xmlns:p14="http://schemas.microsoft.com/office/powerpoint/2010/main" val="775567503"/>
       </p:ext>
     </p:extLst>
   </p:cSld>
@@ -18476,7 +18472,7 @@
     </p:spTree>
     <p:extLst>
       <p:ext uri="{BB962C8B-B14F-4D97-AF65-F5344CB8AC3E}">
-        <p14:creationId xmlns:p14="http://schemas.microsoft.com/office/powerpoint/2010/main" xmlns="" val="1579538806"/>
+        <p14:creationId xmlns:p14="http://schemas.microsoft.com/office/powerpoint/2010/main" val="1579538806"/>
       </p:ext>
     </p:extLst>
   </p:cSld>
@@ -18919,7 +18915,7 @@
     </p:spTree>
     <p:extLst>
       <p:ext uri="{BB962C8B-B14F-4D97-AF65-F5344CB8AC3E}">
-        <p14:creationId xmlns:p14="http://schemas.microsoft.com/office/powerpoint/2010/main" xmlns="" val="3009619785"/>
+        <p14:creationId xmlns:p14="http://schemas.microsoft.com/office/powerpoint/2010/main" val="3009619785"/>
       </p:ext>
     </p:extLst>
   </p:cSld>
@@ -19187,7 +19183,7 @@
     </p:spTree>
     <p:extLst>
       <p:ext uri="{BB962C8B-B14F-4D97-AF65-F5344CB8AC3E}">
-        <p14:creationId xmlns:p14="http://schemas.microsoft.com/office/powerpoint/2010/main" xmlns="" val="3675531021"/>
+        <p14:creationId xmlns:p14="http://schemas.microsoft.com/office/powerpoint/2010/main" val="3675531021"/>
       </p:ext>
     </p:extLst>
   </p:cSld>
@@ -19487,7 +19483,7 @@
     </p:spTree>
     <p:extLst>
       <p:ext uri="{BB962C8B-B14F-4D97-AF65-F5344CB8AC3E}">
-        <p14:creationId xmlns:p14="http://schemas.microsoft.com/office/powerpoint/2010/main" xmlns="" val="1865845751"/>
+        <p14:creationId xmlns:p14="http://schemas.microsoft.com/office/powerpoint/2010/main" val="1865845751"/>
       </p:ext>
     </p:extLst>
   </p:cSld>

</xml_diff>